<commit_message>
updated expression and DE lectures
</commit_message>
<xml_diff>
--- a/assets/lectures/cshl/2020/mini/RNASeq_MiniLecture_03_01_AbundanceEstimation.pptx
+++ b/assets/lectures/cshl/2020/mini/RNASeq_MiniLecture_03_01_AbundanceEstimation.pptx
@@ -207,7 +207,7 @@
           <a:p>
             <a:fld id="{827BD9F9-8452-A342-BB1B-28ECF19E2CC5}" type="datetimeFigureOut">
               <a:rPr lang="en-US" smtClean="0"/>
-              <a:t>11/9/20</a:t>
+              <a:t>11/17/20</a:t>
             </a:fld>
             <a:endParaRPr lang="en-US"/>
           </a:p>
@@ -1684,14 +1684,14 @@
           </a:ln>
           <a:extLst>
             <a:ext uri="{909E8E84-426E-40dd-AFC4-6F175D3DCCD1}">
-              <a14:hiddenFill xmlns="" xmlns:a14="http://schemas.microsoft.com/office/drawing/2010/main">
+              <a14:hiddenFill xmlns:a14="http://schemas.microsoft.com/office/drawing/2010/main" xmlns="">
                 <a:solidFill>
                   <a:srgbClr val="FFFFFF"/>
                 </a:solidFill>
               </a14:hiddenFill>
             </a:ext>
             <a:ext uri="{91240B29-F687-4f45-9708-019B960494DF}">
-              <a14:hiddenLine xmlns="" xmlns:a14="http://schemas.microsoft.com/office/drawing/2010/main" w="9525">
+              <a14:hiddenLine xmlns:a14="http://schemas.microsoft.com/office/drawing/2010/main" xmlns="" w="9525">
                 <a:solidFill>
                   <a:srgbClr val="000000"/>
                 </a:solidFill>
@@ -2069,14 +2069,14 @@
           </a:ln>
           <a:extLst>
             <a:ext uri="{909E8E84-426E-40dd-AFC4-6F175D3DCCD1}">
-              <a14:hiddenFill xmlns="" xmlns:a14="http://schemas.microsoft.com/office/drawing/2010/main">
+              <a14:hiddenFill xmlns:a14="http://schemas.microsoft.com/office/drawing/2010/main" xmlns="">
                 <a:solidFill>
                   <a:srgbClr val="FFFFFF"/>
                 </a:solidFill>
               </a14:hiddenFill>
             </a:ext>
             <a:ext uri="{91240B29-F687-4f45-9708-019B960494DF}">
-              <a14:hiddenLine xmlns="" xmlns:a14="http://schemas.microsoft.com/office/drawing/2010/main" w="9525">
+              <a14:hiddenLine xmlns:a14="http://schemas.microsoft.com/office/drawing/2010/main" xmlns="" w="9525">
                 <a:solidFill>
                   <a:srgbClr val="000000"/>
                 </a:solidFill>
@@ -3794,14 +3794,14 @@
           </a:ln>
           <a:extLst>
             <a:ext uri="{909E8E84-426E-40dd-AFC4-6F175D3DCCD1}">
-              <a14:hiddenFill xmlns="" xmlns:a14="http://schemas.microsoft.com/office/drawing/2010/main">
+              <a14:hiddenFill xmlns:a14="http://schemas.microsoft.com/office/drawing/2010/main" xmlns="">
                 <a:solidFill>
                   <a:srgbClr val="FFFFFF"/>
                 </a:solidFill>
               </a14:hiddenFill>
             </a:ext>
             <a:ext uri="{91240B29-F687-4f45-9708-019B960494DF}">
-              <a14:hiddenLine xmlns="" xmlns:a14="http://schemas.microsoft.com/office/drawing/2010/main" w="9525">
+              <a14:hiddenLine xmlns:a14="http://schemas.microsoft.com/office/drawing/2010/main" xmlns="" w="9525">
                 <a:solidFill>
                   <a:srgbClr val="000000"/>
                 </a:solidFill>
@@ -4684,14 +4684,14 @@
           </a:ln>
           <a:extLst>
             <a:ext uri="{909E8E84-426E-40dd-AFC4-6F175D3DCCD1}">
-              <a14:hiddenFill xmlns:a14="http://schemas.microsoft.com/office/drawing/2010/main" xmlns="">
+              <a14:hiddenFill xmlns="" xmlns:a14="http://schemas.microsoft.com/office/drawing/2010/main">
                 <a:solidFill>
                   <a:srgbClr val="FFFFFF"/>
                 </a:solidFill>
               </a14:hiddenFill>
             </a:ext>
             <a:ext uri="{91240B29-F687-4f45-9708-019B960494DF}">
-              <a14:hiddenLine xmlns:a14="http://schemas.microsoft.com/office/drawing/2010/main" xmlns="" w="9525">
+              <a14:hiddenLine xmlns="" xmlns:a14="http://schemas.microsoft.com/office/drawing/2010/main" w="9525">
                 <a:solidFill>
                   <a:srgbClr val="000000"/>
                 </a:solidFill>
@@ -5239,14 +5239,14 @@
           </a:ln>
           <a:extLst>
             <a:ext uri="{909E8E84-426E-40dd-AFC4-6F175D3DCCD1}">
-              <a14:hiddenFill xmlns:a14="http://schemas.microsoft.com/office/drawing/2010/main" xmlns="">
+              <a14:hiddenFill xmlns="" xmlns:a14="http://schemas.microsoft.com/office/drawing/2010/main">
                 <a:solidFill>
                   <a:srgbClr val="FFFFFF"/>
                 </a:solidFill>
               </a14:hiddenFill>
             </a:ext>
             <a:ext uri="{91240B29-F687-4f45-9708-019B960494DF}">
-              <a14:hiddenLine xmlns:a14="http://schemas.microsoft.com/office/drawing/2010/main" xmlns="" w="9525">
+              <a14:hiddenLine xmlns="" xmlns:a14="http://schemas.microsoft.com/office/drawing/2010/main" w="9525">
                 <a:solidFill>
                   <a:srgbClr val="000000"/>
                 </a:solidFill>
@@ -5436,14 +5436,14 @@
           </a:ln>
           <a:extLst>
             <a:ext uri="{909E8E84-426E-40dd-AFC4-6F175D3DCCD1}">
-              <a14:hiddenFill xmlns:a14="http://schemas.microsoft.com/office/drawing/2010/main" xmlns="">
+              <a14:hiddenFill xmlns="" xmlns:a14="http://schemas.microsoft.com/office/drawing/2010/main">
                 <a:solidFill>
                   <a:srgbClr val="FFFFFF"/>
                 </a:solidFill>
               </a14:hiddenFill>
             </a:ext>
             <a:ext uri="{91240B29-F687-4f45-9708-019B960494DF}">
-              <a14:hiddenLine xmlns:a14="http://schemas.microsoft.com/office/drawing/2010/main" xmlns="" w="9525">
+              <a14:hiddenLine xmlns="" xmlns:a14="http://schemas.microsoft.com/office/drawing/2010/main" w="9525">
                 <a:solidFill>
                   <a:srgbClr val="000000"/>
                 </a:solidFill>
@@ -5659,7 +5659,7 @@
                 <a:latin typeface="Calibri" charset="0"/>
                 <a:ea typeface="ＭＳ Ｐゴシック" charset="0"/>
               </a:rPr>
-              <a:t>What is FPKM (RPKM)</a:t>
+              <a:t>What is FPKM (RPKM)?</a:t>
             </a:r>
           </a:p>
         </p:txBody>
@@ -5814,7 +5814,7 @@
                 <a:latin typeface="Calibri" charset="0"/>
                 <a:ea typeface="ＭＳ Ｐゴシック" charset="0"/>
               </a:rPr>
-              <a:t>What is FPKM</a:t>
+              <a:t>What is FPKM?</a:t>
             </a:r>
           </a:p>
         </p:txBody>
@@ -6236,7 +6236,7 @@
                 <a:latin typeface="Calibri" charset="0"/>
                 <a:ea typeface="ＭＳ Ｐゴシック" charset="0"/>
               </a:rPr>
-              <a:t>What is FPKM</a:t>
+              <a:t>What is FPKM?</a:t>
             </a:r>
           </a:p>
         </p:txBody>
@@ -6259,7 +6259,7 @@
         </p:spPr>
         <p:txBody>
           <a:bodyPr wrap="square">
-            <a:normAutofit/>
+            <a:normAutofit fontScale="92500" lnSpcReduction="10000"/>
           </a:bodyPr>
           <a:lstStyle/>
           <a:p>
@@ -6289,11 +6289,39 @@
           </a:p>
           <a:p>
             <a:r>
+              <a:rPr lang="en-US" dirty="0">
+                <a:latin typeface="Calibri" charset="0"/>
+                <a:ea typeface="ＭＳ Ｐゴシック" charset="0"/>
+              </a:rPr>
+              <a:t>C = number of mappable fragments for a gene (transcript)</a:t>
+            </a:r>
+          </a:p>
+          <a:p>
+            <a:r>
+              <a:rPr lang="en-US" dirty="0">
+                <a:latin typeface="Calibri" charset="0"/>
+                <a:ea typeface="ＭＳ Ｐゴシック" charset="0"/>
+              </a:rPr>
+              <a:t>N = total number of mappable fragments in the library </a:t>
+            </a:r>
+          </a:p>
+          <a:p>
+            <a:r>
+              <a:rPr lang="en-US" dirty="0">
+                <a:latin typeface="Calibri" charset="0"/>
+                <a:ea typeface="ＭＳ Ｐゴシック" charset="0"/>
+              </a:rPr>
+              <a:t>L = number of base pairs in the gene (transcript)</a:t>
+            </a:r>
+          </a:p>
+          <a:p>
+            <a:pPr lvl="1"/>
+            <a:r>
               <a:rPr lang="nl-NL" dirty="0">
                 <a:latin typeface="Calibri" charset="0"/>
                 <a:ea typeface="ＭＳ Ｐゴシック" charset="0"/>
               </a:rPr>
-              <a:t>FPKM = (10^9 * C) / (N * L)</a:t>
+              <a:t>FPKM = (C / (N x L) ) x 1,000 x 1,000,000</a:t>
             </a:r>
             <a:r>
               <a:rPr lang="en-US" dirty="0">
@@ -6310,78 +6338,18 @@
                 <a:latin typeface="Calibri" charset="0"/>
                 <a:ea typeface="ＭＳ Ｐゴシック" charset="0"/>
               </a:rPr>
-              <a:t>C = number of </a:t>
-            </a:r>
-            <a:r>
-              <a:rPr lang="en-US" dirty="0" err="1">
-                <a:latin typeface="Calibri" charset="0"/>
-                <a:ea typeface="ＭＳ Ｐゴシック" charset="0"/>
-              </a:rPr>
-              <a:t>mappable</a:t>
-            </a:r>
+              <a:t>FPKM = (1,000,000,000 x C) / (N x L)</a:t>
+            </a:r>
+          </a:p>
+          <a:p>
+            <a:pPr lvl="1"/>
             <a:r>
               <a:rPr lang="en-US" dirty="0">
                 <a:latin typeface="Calibri" charset="0"/>
                 <a:ea typeface="ＭＳ Ｐゴシック" charset="0"/>
               </a:rPr>
-              <a:t> reads/fragments for a gene/transcript/exon/</a:t>
-            </a:r>
-            <a:r>
-              <a:rPr lang="en-US" dirty="0" err="1">
-                <a:latin typeface="Calibri" charset="0"/>
-                <a:ea typeface="ＭＳ Ｐゴシック" charset="0"/>
-              </a:rPr>
-              <a:t>etc</a:t>
-            </a:r>
-            <a:endParaRPr lang="en-US" dirty="0">
-              <a:latin typeface="Calibri" charset="0"/>
-              <a:ea typeface="ＭＳ Ｐゴシック" charset="0"/>
-            </a:endParaRPr>
-          </a:p>
-          <a:p>
-            <a:pPr lvl="1"/>
-            <a:r>
-              <a:rPr lang="en-US" dirty="0">
-                <a:latin typeface="Calibri" charset="0"/>
-                <a:ea typeface="ＭＳ Ｐゴシック" charset="0"/>
-              </a:rPr>
-              <a:t>N = total number of </a:t>
-            </a:r>
-            <a:r>
-              <a:rPr lang="en-US" dirty="0" err="1">
-                <a:latin typeface="Calibri" charset="0"/>
-                <a:ea typeface="ＭＳ Ｐゴシック" charset="0"/>
-              </a:rPr>
-              <a:t>mappable</a:t>
-            </a:r>
-            <a:r>
-              <a:rPr lang="en-US" dirty="0">
-                <a:latin typeface="Calibri" charset="0"/>
-                <a:ea typeface="ＭＳ Ｐゴシック" charset="0"/>
-              </a:rPr>
-              <a:t> reads/fragments in the library </a:t>
-            </a:r>
-          </a:p>
-          <a:p>
-            <a:pPr lvl="1"/>
-            <a:r>
-              <a:rPr lang="en-US" dirty="0">
-                <a:latin typeface="Calibri" charset="0"/>
-                <a:ea typeface="ＭＳ Ｐゴシック" charset="0"/>
-              </a:rPr>
-              <a:t>L = number of base pairs in the gene/transcript/exon/</a:t>
-            </a:r>
-            <a:r>
-              <a:rPr lang="en-US" dirty="0" err="1">
-                <a:latin typeface="Calibri" charset="0"/>
-                <a:ea typeface="ＭＳ Ｐゴシック" charset="0"/>
-              </a:rPr>
-              <a:t>etc</a:t>
-            </a:r>
-            <a:endParaRPr lang="en-US" dirty="0">
-              <a:latin typeface="Calibri" charset="0"/>
-              <a:ea typeface="ＭＳ Ｐゴシック" charset="0"/>
-            </a:endParaRPr>
+              <a:t>FPKM = (C / (N / 1,000,000)) / (L/1000)</a:t>
+            </a:r>
           </a:p>
           <a:p>
             <a:pPr marL="457200" lvl="1" indent="0">
@@ -6455,6 +6423,245 @@
   <p:clrMapOvr>
     <a:masterClrMapping/>
   </p:clrMapOvr>
+  <p:timing>
+    <p:tnLst>
+      <p:par>
+        <p:cTn id="1" dur="indefinite" restart="never" nodeType="tmRoot">
+          <p:childTnLst>
+            <p:seq concurrent="1" nextAc="seek">
+              <p:cTn id="2" dur="indefinite" nodeType="mainSeq">
+                <p:childTnLst>
+                  <p:par>
+                    <p:cTn id="3" fill="hold">
+                      <p:stCondLst>
+                        <p:cond delay="indefinite"/>
+                      </p:stCondLst>
+                      <p:childTnLst>
+                        <p:par>
+                          <p:cTn id="4" fill="hold">
+                            <p:stCondLst>
+                              <p:cond delay="0"/>
+                            </p:stCondLst>
+                            <p:childTnLst>
+                              <p:par>
+                                <p:cTn id="5" presetID="1" presetClass="entr" presetSubtype="0" fill="hold" nodeType="clickEffect">
+                                  <p:stCondLst>
+                                    <p:cond delay="0"/>
+                                  </p:stCondLst>
+                                  <p:childTnLst>
+                                    <p:set>
+                                      <p:cBhvr>
+                                        <p:cTn id="6" dur="1" fill="hold">
+                                          <p:stCondLst>
+                                            <p:cond delay="0"/>
+                                          </p:stCondLst>
+                                        </p:cTn>
+                                        <p:tgtEl>
+                                          <p:spTgt spid="28674">
+                                            <p:txEl>
+                                              <p:pRg st="7" end="7"/>
+                                            </p:txEl>
+                                          </p:spTgt>
+                                        </p:tgtEl>
+                                        <p:attrNameLst>
+                                          <p:attrName>style.visibility</p:attrName>
+                                        </p:attrNameLst>
+                                      </p:cBhvr>
+                                      <p:to>
+                                        <p:strVal val="visible"/>
+                                      </p:to>
+                                    </p:set>
+                                  </p:childTnLst>
+                                </p:cTn>
+                              </p:par>
+                            </p:childTnLst>
+                          </p:cTn>
+                        </p:par>
+                      </p:childTnLst>
+                    </p:cTn>
+                  </p:par>
+                  <p:par>
+                    <p:cTn id="7" fill="hold">
+                      <p:stCondLst>
+                        <p:cond delay="indefinite"/>
+                      </p:stCondLst>
+                      <p:childTnLst>
+                        <p:par>
+                          <p:cTn id="8" fill="hold">
+                            <p:stCondLst>
+                              <p:cond delay="0"/>
+                            </p:stCondLst>
+                            <p:childTnLst>
+                              <p:par>
+                                <p:cTn id="9" presetID="1" presetClass="entr" presetSubtype="0" fill="hold" nodeType="clickEffect">
+                                  <p:stCondLst>
+                                    <p:cond delay="0"/>
+                                  </p:stCondLst>
+                                  <p:childTnLst>
+                                    <p:set>
+                                      <p:cBhvr>
+                                        <p:cTn id="10" dur="1" fill="hold">
+                                          <p:stCondLst>
+                                            <p:cond delay="0"/>
+                                          </p:stCondLst>
+                                        </p:cTn>
+                                        <p:tgtEl>
+                                          <p:spTgt spid="28674">
+                                            <p:txEl>
+                                              <p:pRg st="8" end="8"/>
+                                            </p:txEl>
+                                          </p:spTgt>
+                                        </p:tgtEl>
+                                        <p:attrNameLst>
+                                          <p:attrName>style.visibility</p:attrName>
+                                        </p:attrNameLst>
+                                      </p:cBhvr>
+                                      <p:to>
+                                        <p:strVal val="visible"/>
+                                      </p:to>
+                                    </p:set>
+                                  </p:childTnLst>
+                                </p:cTn>
+                              </p:par>
+                            </p:childTnLst>
+                          </p:cTn>
+                        </p:par>
+                      </p:childTnLst>
+                    </p:cTn>
+                  </p:par>
+                  <p:par>
+                    <p:cTn id="11" fill="hold">
+                      <p:stCondLst>
+                        <p:cond delay="indefinite"/>
+                      </p:stCondLst>
+                      <p:childTnLst>
+                        <p:par>
+                          <p:cTn id="12" fill="hold">
+                            <p:stCondLst>
+                              <p:cond delay="0"/>
+                            </p:stCondLst>
+                            <p:childTnLst>
+                              <p:par>
+                                <p:cTn id="13" presetID="1" presetClass="entr" presetSubtype="0" fill="hold" nodeType="clickEffect">
+                                  <p:stCondLst>
+                                    <p:cond delay="0"/>
+                                  </p:stCondLst>
+                                  <p:childTnLst>
+                                    <p:set>
+                                      <p:cBhvr>
+                                        <p:cTn id="14" dur="1" fill="hold">
+                                          <p:stCondLst>
+                                            <p:cond delay="0"/>
+                                          </p:stCondLst>
+                                        </p:cTn>
+                                        <p:tgtEl>
+                                          <p:spTgt spid="28674">
+                                            <p:txEl>
+                                              <p:pRg st="10" end="10"/>
+                                            </p:txEl>
+                                          </p:spTgt>
+                                        </p:tgtEl>
+                                        <p:attrNameLst>
+                                          <p:attrName>style.visibility</p:attrName>
+                                        </p:attrNameLst>
+                                      </p:cBhvr>
+                                      <p:to>
+                                        <p:strVal val="visible"/>
+                                      </p:to>
+                                    </p:set>
+                                  </p:childTnLst>
+                                </p:cTn>
+                              </p:par>
+                              <p:par>
+                                <p:cTn id="15" presetID="1" presetClass="entr" presetSubtype="0" fill="hold" nodeType="withEffect">
+                                  <p:stCondLst>
+                                    <p:cond delay="0"/>
+                                  </p:stCondLst>
+                                  <p:childTnLst>
+                                    <p:set>
+                                      <p:cBhvr>
+                                        <p:cTn id="16" dur="1" fill="hold">
+                                          <p:stCondLst>
+                                            <p:cond delay="0"/>
+                                          </p:stCondLst>
+                                        </p:cTn>
+                                        <p:tgtEl>
+                                          <p:spTgt spid="28674">
+                                            <p:txEl>
+                                              <p:pRg st="11" end="11"/>
+                                            </p:txEl>
+                                          </p:spTgt>
+                                        </p:tgtEl>
+                                        <p:attrNameLst>
+                                          <p:attrName>style.visibility</p:attrName>
+                                        </p:attrNameLst>
+                                      </p:cBhvr>
+                                      <p:to>
+                                        <p:strVal val="visible"/>
+                                      </p:to>
+                                    </p:set>
+                                  </p:childTnLst>
+                                </p:cTn>
+                              </p:par>
+                              <p:par>
+                                <p:cTn id="17" presetID="1" presetClass="entr" presetSubtype="0" fill="hold" nodeType="withEffect">
+                                  <p:stCondLst>
+                                    <p:cond delay="0"/>
+                                  </p:stCondLst>
+                                  <p:childTnLst>
+                                    <p:set>
+                                      <p:cBhvr>
+                                        <p:cTn id="18" dur="1" fill="hold">
+                                          <p:stCondLst>
+                                            <p:cond delay="0"/>
+                                          </p:stCondLst>
+                                        </p:cTn>
+                                        <p:tgtEl>
+                                          <p:spTgt spid="28674">
+                                            <p:txEl>
+                                              <p:pRg st="12" end="12"/>
+                                            </p:txEl>
+                                          </p:spTgt>
+                                        </p:tgtEl>
+                                        <p:attrNameLst>
+                                          <p:attrName>style.visibility</p:attrName>
+                                        </p:attrNameLst>
+                                      </p:cBhvr>
+                                      <p:to>
+                                        <p:strVal val="visible"/>
+                                      </p:to>
+                                    </p:set>
+                                  </p:childTnLst>
+                                </p:cTn>
+                              </p:par>
+                            </p:childTnLst>
+                          </p:cTn>
+                        </p:par>
+                      </p:childTnLst>
+                    </p:cTn>
+                  </p:par>
+                </p:childTnLst>
+              </p:cTn>
+              <p:prevCondLst>
+                <p:cond evt="onPrev" delay="0">
+                  <p:tgtEl>
+                    <p:sldTgt/>
+                  </p:tgtEl>
+                </p:cond>
+              </p:prevCondLst>
+              <p:nextCondLst>
+                <p:cond evt="onNext" delay="0">
+                  <p:tgtEl>
+                    <p:sldTgt/>
+                  </p:tgtEl>
+                </p:cond>
+              </p:nextCondLst>
+            </p:seq>
+          </p:childTnLst>
+        </p:cTn>
+      </p:par>
+    </p:tnLst>
+  </p:timing>
 </p:sld>
 </file>
 

</xml_diff>